<commit_message>
PowerPoint writer: expand builtin reference doc to model all layouts
The previous built-in reference doc had only title and content
layouts. Add in a section-header slide and a two-content slide, so
users can more easily modify it to build their own templates.

Golden files needed to be regenerated. Checked on MS PowerPoint 2013.
</commit_message>
<xml_diff>
--- a/test/pptx/document-properties-short-desc.pptx
+++ b/test/pptx/document-properties-short-desc.pptx
@@ -305,7 +305,7 @@
           <a:p>
             <a:fld id="{241EB5C9-1307-BA42-ABA2-0BC069CD8E7F}" type="datetimeFigureOut">
               <a:rPr lang="en-US" smtClean="0"/>
-              <a:t>2/17/2018</a:t>
+              <a:t>4/5/2019</a:t>
             </a:fld>
             <a:endParaRPr lang="en-US"/>
           </a:p>
@@ -475,7 +475,7 @@
           <a:p>
             <a:fld id="{241EB5C9-1307-BA42-ABA2-0BC069CD8E7F}" type="datetimeFigureOut">
               <a:rPr lang="en-US" smtClean="0"/>
-              <a:t>2/17/2018</a:t>
+              <a:t>4/5/2019</a:t>
             </a:fld>
             <a:endParaRPr lang="en-US"/>
           </a:p>
@@ -655,7 +655,7 @@
           <a:p>
             <a:fld id="{241EB5C9-1307-BA42-ABA2-0BC069CD8E7F}" type="datetimeFigureOut">
               <a:rPr lang="en-US" smtClean="0"/>
-              <a:t>2/17/2018</a:t>
+              <a:t>4/5/2019</a:t>
             </a:fld>
             <a:endParaRPr lang="en-US"/>
           </a:p>
@@ -825,7 +825,7 @@
           <a:p>
             <a:fld id="{241EB5C9-1307-BA42-ABA2-0BC069CD8E7F}" type="datetimeFigureOut">
               <a:rPr lang="en-US" smtClean="0"/>
-              <a:t>2/17/2018</a:t>
+              <a:t>4/5/2019</a:t>
             </a:fld>
             <a:endParaRPr lang="en-US"/>
           </a:p>
@@ -1071,7 +1071,7 @@
           <a:p>
             <a:fld id="{241EB5C9-1307-BA42-ABA2-0BC069CD8E7F}" type="datetimeFigureOut">
               <a:rPr lang="en-US" smtClean="0"/>
-              <a:t>2/17/2018</a:t>
+              <a:t>4/5/2019</a:t>
             </a:fld>
             <a:endParaRPr lang="en-US"/>
           </a:p>
@@ -1359,7 +1359,7 @@
           <a:p>
             <a:fld id="{241EB5C9-1307-BA42-ABA2-0BC069CD8E7F}" type="datetimeFigureOut">
               <a:rPr lang="en-US" smtClean="0"/>
-              <a:t>2/17/2018</a:t>
+              <a:t>4/5/2019</a:t>
             </a:fld>
             <a:endParaRPr lang="en-US"/>
           </a:p>
@@ -1781,7 +1781,7 @@
           <a:p>
             <a:fld id="{241EB5C9-1307-BA42-ABA2-0BC069CD8E7F}" type="datetimeFigureOut">
               <a:rPr lang="en-US" smtClean="0"/>
-              <a:t>2/17/2018</a:t>
+              <a:t>4/5/2019</a:t>
             </a:fld>
             <a:endParaRPr lang="en-US"/>
           </a:p>
@@ -1899,7 +1899,7 @@
           <a:p>
             <a:fld id="{241EB5C9-1307-BA42-ABA2-0BC069CD8E7F}" type="datetimeFigureOut">
               <a:rPr lang="en-US" smtClean="0"/>
-              <a:t>2/17/2018</a:t>
+              <a:t>4/5/2019</a:t>
             </a:fld>
             <a:endParaRPr lang="en-US"/>
           </a:p>
@@ -1994,7 +1994,7 @@
           <a:p>
             <a:fld id="{241EB5C9-1307-BA42-ABA2-0BC069CD8E7F}" type="datetimeFigureOut">
               <a:rPr lang="en-US" smtClean="0"/>
-              <a:t>2/17/2018</a:t>
+              <a:t>4/5/2019</a:t>
             </a:fld>
             <a:endParaRPr lang="en-US"/>
           </a:p>
@@ -2271,7 +2271,7 @@
           <a:p>
             <a:fld id="{241EB5C9-1307-BA42-ABA2-0BC069CD8E7F}" type="datetimeFigureOut">
               <a:rPr lang="en-US" smtClean="0"/>
-              <a:t>2/17/2018</a:t>
+              <a:t>4/5/2019</a:t>
             </a:fld>
             <a:endParaRPr lang="en-US"/>
           </a:p>
@@ -2524,7 +2524,7 @@
           <a:p>
             <a:fld id="{241EB5C9-1307-BA42-ABA2-0BC069CD8E7F}" type="datetimeFigureOut">
               <a:rPr lang="en-US" smtClean="0"/>
-              <a:t>2/17/2018</a:t>
+              <a:t>4/5/2019</a:t>
             </a:fld>
             <a:endParaRPr lang="en-US"/>
           </a:p>
@@ -2737,7 +2737,7 @@
           <a:p>
             <a:fld id="{241EB5C9-1307-BA42-ABA2-0BC069CD8E7F}" type="datetimeFigureOut">
               <a:rPr lang="en-US" smtClean="0"/>
-              <a:t>2/17/2018</a:t>
+              <a:t>4/5/2019</a:t>
             </a:fld>
             <a:endParaRPr lang="en-US"/>
           </a:p>

</xml_diff>